<commit_message>
adjusted email templates to contain new main color and logo
</commit_message>
<xml_diff>
--- a/Logo.pptx
+++ b/Logo.pptx
@@ -104,6 +104,11 @@
       </a:defRPr>
     </a:lvl9pPr>
   </p:defaultTextStyle>
+  <p:extLst>
+    <p:ext uri="{EFAFB233-063F-42B5-8137-9DF3F51BA10A}">
+      <p15:sldGuideLst xmlns:p15="http://schemas.microsoft.com/office/powerpoint/2012/main"/>
+    </p:ext>
+  </p:extLst>
 </p:presentation>
 </file>
 
@@ -3335,7 +3340,7 @@
         </p:nvGrpSpPr>
         <p:grpSpPr>
           <a:xfrm>
-            <a:off x="261743" y="523699"/>
+            <a:off x="0" y="284306"/>
             <a:ext cx="4791482" cy="4571153"/>
             <a:chOff x="2364421" y="748986"/>
             <a:chExt cx="4791482" cy="4571153"/>
@@ -3527,10 +3532,10 @@
         </p:nvGrpSpPr>
         <p:grpSpPr>
           <a:xfrm>
-            <a:off x="5980056" y="411056"/>
-            <a:ext cx="4791482" cy="4571153"/>
+            <a:off x="7177017" y="309020"/>
+            <a:ext cx="4815028" cy="4571153"/>
             <a:chOff x="5980056" y="411056"/>
-            <a:chExt cx="4791482" cy="4571153"/>
+            <a:chExt cx="4815028" cy="4571153"/>
           </a:xfrm>
         </p:grpSpPr>
         <p:grpSp>
@@ -3548,9 +3553,9 @@
           <p:grpSpPr>
             <a:xfrm>
               <a:off x="5980056" y="411056"/>
-              <a:ext cx="4791482" cy="4571153"/>
+              <a:ext cx="4815028" cy="4571153"/>
               <a:chOff x="2364421" y="748986"/>
-              <a:chExt cx="4791482" cy="4571153"/>
+              <a:chExt cx="4815028" cy="4571153"/>
             </a:xfrm>
           </p:grpSpPr>
           <p:sp>
@@ -3624,7 +3629,7 @@
             </p:nvSpPr>
             <p:spPr>
               <a:xfrm rot="1800000">
-                <a:off x="3807903" y="1584600"/>
+                <a:off x="3831449" y="1635618"/>
                 <a:ext cx="3348000" cy="2908800"/>
               </a:xfrm>
               <a:prstGeom prst="hexagon">
@@ -3739,7 +3744,7 @@
           </p:nvSpPr>
           <p:spPr>
             <a:xfrm>
-              <a:off x="6458048" y="1820613"/>
+              <a:off x="6383483" y="1837570"/>
               <a:ext cx="4090607" cy="1107996"/>
             </a:xfrm>
             <a:prstGeom prst="rect">
@@ -3765,6 +3770,269 @@
                 <a:t>plevents</a:t>
               </a:r>
               <a:endParaRPr lang="de-DE" sz="6600" dirty="0">
+                <a:solidFill>
+                  <a:schemeClr val="accent1">
+                    <a:lumMod val="75000"/>
+                  </a:schemeClr>
+                </a:solidFill>
+                <a:latin typeface="Arial Black" panose="020B0A04020102020204" pitchFamily="34" charset="0"/>
+              </a:endParaRPr>
+            </a:p>
+          </p:txBody>
+        </p:sp>
+      </p:grpSp>
+      <p:grpSp>
+        <p:nvGrpSpPr>
+          <p:cNvPr id="13" name="Gruppieren 12">
+            <a:extLst>
+              <a:ext uri="{FF2B5EF4-FFF2-40B4-BE49-F238E27FC236}">
+                <a16:creationId xmlns:a16="http://schemas.microsoft.com/office/drawing/2014/main" id="{041D3E46-74BB-40C2-BC63-6757972A2DDA}"/>
+              </a:ext>
+            </a:extLst>
+          </p:cNvPr>
+          <p:cNvGrpSpPr/>
+          <p:nvPr/>
+        </p:nvGrpSpPr>
+        <p:grpSpPr>
+          <a:xfrm>
+            <a:off x="4669229" y="4456422"/>
+            <a:ext cx="813094" cy="774888"/>
+            <a:chOff x="5980056" y="411056"/>
+            <a:chExt cx="4796531" cy="4571153"/>
+          </a:xfrm>
+        </p:grpSpPr>
+        <p:grpSp>
+          <p:nvGrpSpPr>
+            <p:cNvPr id="22" name="Gruppieren 21">
+              <a:extLst>
+                <a:ext uri="{FF2B5EF4-FFF2-40B4-BE49-F238E27FC236}">
+                  <a16:creationId xmlns:a16="http://schemas.microsoft.com/office/drawing/2014/main" id="{0C239C82-4B66-42F1-A17F-A8B960A4AD31}"/>
+                </a:ext>
+              </a:extLst>
+            </p:cNvPr>
+            <p:cNvGrpSpPr/>
+            <p:nvPr/>
+          </p:nvGrpSpPr>
+          <p:grpSpPr>
+            <a:xfrm>
+              <a:off x="5980056" y="411056"/>
+              <a:ext cx="4791482" cy="4571153"/>
+              <a:chOff x="2364421" y="748986"/>
+              <a:chExt cx="4791482" cy="4571153"/>
+            </a:xfrm>
+          </p:grpSpPr>
+          <p:sp>
+            <p:nvSpPr>
+              <p:cNvPr id="24" name="Sechseck 23">
+                <a:extLst>
+                  <a:ext uri="{FF2B5EF4-FFF2-40B4-BE49-F238E27FC236}">
+                    <a16:creationId xmlns:a16="http://schemas.microsoft.com/office/drawing/2014/main" id="{8A3946A2-F093-4B2B-B999-C838ECB12385}"/>
+                  </a:ext>
+                </a:extLst>
+              </p:cNvPr>
+              <p:cNvSpPr/>
+              <p:nvPr/>
+            </p:nvSpPr>
+            <p:spPr>
+              <a:xfrm rot="1800000">
+                <a:off x="2366011" y="748986"/>
+                <a:ext cx="3342682" cy="2902457"/>
+              </a:xfrm>
+              <a:prstGeom prst="hexagon">
+                <a:avLst>
+                  <a:gd name="adj" fmla="val 28845"/>
+                  <a:gd name="vf" fmla="val 115470"/>
+                </a:avLst>
+              </a:prstGeom>
+              <a:solidFill>
+                <a:srgbClr val="83F1C5">
+                  <a:alpha val="80000"/>
+                </a:srgbClr>
+              </a:solidFill>
+              <a:ln>
+                <a:noFill/>
+              </a:ln>
+            </p:spPr>
+            <p:style>
+              <a:lnRef idx="2">
+                <a:schemeClr val="accent1">
+                  <a:shade val="50000"/>
+                </a:schemeClr>
+              </a:lnRef>
+              <a:fillRef idx="1">
+                <a:schemeClr val="accent1"/>
+              </a:fillRef>
+              <a:effectRef idx="0">
+                <a:schemeClr val="accent1"/>
+              </a:effectRef>
+              <a:fontRef idx="minor">
+                <a:schemeClr val="lt1"/>
+              </a:fontRef>
+            </p:style>
+            <p:txBody>
+              <a:bodyPr rtlCol="0" anchor="ctr"/>
+              <a:lstStyle/>
+              <a:p>
+                <a:pPr algn="ctr"/>
+                <a:endParaRPr lang="de-DE"/>
+              </a:p>
+            </p:txBody>
+          </p:sp>
+          <p:sp>
+            <p:nvSpPr>
+              <p:cNvPr id="25" name="Sechseck 24">
+                <a:extLst>
+                  <a:ext uri="{FF2B5EF4-FFF2-40B4-BE49-F238E27FC236}">
+                    <a16:creationId xmlns:a16="http://schemas.microsoft.com/office/drawing/2014/main" id="{FE8D777B-BCC2-4323-B75F-E373E95B4FC1}"/>
+                  </a:ext>
+                </a:extLst>
+              </p:cNvPr>
+              <p:cNvSpPr/>
+              <p:nvPr/>
+            </p:nvSpPr>
+            <p:spPr>
+              <a:xfrm rot="1800000">
+                <a:off x="3807903" y="1584600"/>
+                <a:ext cx="3348000" cy="2908800"/>
+              </a:xfrm>
+              <a:prstGeom prst="hexagon">
+                <a:avLst>
+                  <a:gd name="adj" fmla="val 28825"/>
+                  <a:gd name="vf" fmla="val 115470"/>
+                </a:avLst>
+              </a:prstGeom>
+              <a:solidFill>
+                <a:srgbClr val="83DDF1">
+                  <a:alpha val="80000"/>
+                </a:srgbClr>
+              </a:solidFill>
+              <a:ln>
+                <a:noFill/>
+              </a:ln>
+            </p:spPr>
+            <p:style>
+              <a:lnRef idx="2">
+                <a:schemeClr val="accent1">
+                  <a:shade val="50000"/>
+                </a:schemeClr>
+              </a:lnRef>
+              <a:fillRef idx="1">
+                <a:schemeClr val="accent1"/>
+              </a:fillRef>
+              <a:effectRef idx="0">
+                <a:schemeClr val="accent1"/>
+              </a:effectRef>
+              <a:fontRef idx="minor">
+                <a:schemeClr val="lt1"/>
+              </a:fontRef>
+            </p:style>
+            <p:txBody>
+              <a:bodyPr rtlCol="0" anchor="ctr"/>
+              <a:lstStyle/>
+              <a:p>
+                <a:pPr algn="ctr"/>
+                <a:endParaRPr lang="de-DE"/>
+              </a:p>
+            </p:txBody>
+          </p:sp>
+          <p:sp>
+            <p:nvSpPr>
+              <p:cNvPr id="26" name="Sechseck 25">
+                <a:extLst>
+                  <a:ext uri="{FF2B5EF4-FFF2-40B4-BE49-F238E27FC236}">
+                    <a16:creationId xmlns:a16="http://schemas.microsoft.com/office/drawing/2014/main" id="{7F0EEA00-404E-4891-889C-EC1E18FC02CD}"/>
+                  </a:ext>
+                </a:extLst>
+              </p:cNvPr>
+              <p:cNvSpPr/>
+              <p:nvPr/>
+            </p:nvSpPr>
+            <p:spPr>
+              <a:xfrm rot="1800000">
+                <a:off x="2364421" y="2417682"/>
+                <a:ext cx="3342682" cy="2902457"/>
+              </a:xfrm>
+              <a:prstGeom prst="hexagon">
+                <a:avLst>
+                  <a:gd name="adj" fmla="val 28825"/>
+                  <a:gd name="vf" fmla="val 115470"/>
+                </a:avLst>
+              </a:prstGeom>
+              <a:solidFill>
+                <a:srgbClr val="83F1F1">
+                  <a:alpha val="80000"/>
+                </a:srgbClr>
+              </a:solidFill>
+              <a:ln>
+                <a:noFill/>
+              </a:ln>
+            </p:spPr>
+            <p:style>
+              <a:lnRef idx="2">
+                <a:schemeClr val="accent1">
+                  <a:shade val="50000"/>
+                </a:schemeClr>
+              </a:lnRef>
+              <a:fillRef idx="1">
+                <a:schemeClr val="accent1"/>
+              </a:fillRef>
+              <a:effectRef idx="0">
+                <a:schemeClr val="accent1"/>
+              </a:effectRef>
+              <a:fontRef idx="minor">
+                <a:schemeClr val="lt1"/>
+              </a:fontRef>
+            </p:style>
+            <p:txBody>
+              <a:bodyPr rtlCol="0" anchor="ctr"/>
+              <a:lstStyle/>
+              <a:p>
+                <a:pPr algn="ctr"/>
+                <a:endParaRPr lang="de-DE" dirty="0"/>
+              </a:p>
+            </p:txBody>
+          </p:sp>
+        </p:grpSp>
+        <p:sp>
+          <p:nvSpPr>
+            <p:cNvPr id="23" name="Textfeld 22">
+              <a:extLst>
+                <a:ext uri="{FF2B5EF4-FFF2-40B4-BE49-F238E27FC236}">
+                  <a16:creationId xmlns:a16="http://schemas.microsoft.com/office/drawing/2014/main" id="{DF4591BF-EEBF-4C2C-B6DB-FBE9EFC5F7E1}"/>
+                </a:ext>
+              </a:extLst>
+            </p:cNvPr>
+            <p:cNvSpPr txBox="1"/>
+            <p:nvPr/>
+          </p:nvSpPr>
+          <p:spPr>
+            <a:xfrm>
+              <a:off x="5989807" y="1577128"/>
+              <a:ext cx="4786780" cy="1497880"/>
+            </a:xfrm>
+            <a:prstGeom prst="rect">
+              <a:avLst/>
+            </a:prstGeom>
+            <a:noFill/>
+          </p:spPr>
+          <p:txBody>
+            <a:bodyPr wrap="none" rtlCol="0">
+              <a:spAutoFit/>
+            </a:bodyPr>
+            <a:lstStyle/>
+            <a:p>
+              <a:r>
+                <a:rPr lang="de-DE" sz="1050" dirty="0" err="1">
+                  <a:solidFill>
+                    <a:schemeClr val="accent1">
+                      <a:lumMod val="75000"/>
+                    </a:schemeClr>
+                  </a:solidFill>
+                  <a:latin typeface="Arial Black" panose="020B0A04020102020204" pitchFamily="34" charset="0"/>
+                </a:rPr>
+                <a:t>plevents</a:t>
+              </a:r>
+              <a:endParaRPr lang="de-DE" sz="1050" dirty="0">
                 <a:solidFill>
                   <a:schemeClr val="accent1">
                     <a:lumMod val="75000"/>

</xml_diff>